<commit_message>
Sarah messed with table alignment, please replace figures with versions without legends
</commit_message>
<xml_diff>
--- a/Final Poster Draft.pptx
+++ b/Final Poster Draft.pptx
@@ -861,11 +861,7 @@
             </a:pPr>
             <a:r>
               <a:rPr lang="en-US" dirty="0"/>
-              <a:t>How to best cite all the sources. Sentence about them living in the QR code? </a:t>
-            </a:r>
-            <a:r>
-              <a:rPr lang="en-US"/>
-              <a:t>Which does need to be fixed LOL</a:t>
+              <a:t>How to best cite all the sources. Sentence about them living in the QR code? Which does need to be fixed LOL</a:t>
             </a:r>
             <a:endParaRPr dirty="0"/>
           </a:p>
@@ -6685,13 +6681,13 @@
               <p:nvPr>
                 <p:extLst>
                   <p:ext uri="{D42A27DB-BD31-4B8C-83A1-F6EECF244321}">
-                    <p14:modId xmlns:p14="http://schemas.microsoft.com/office/powerpoint/2010/main" val="60645567"/>
+                    <p14:modId xmlns:p14="http://schemas.microsoft.com/office/powerpoint/2010/main" val="3655561168"/>
                   </p:ext>
                 </p:extLst>
               </p:nvPr>
             </p:nvGraphicFramePr>
             <p:xfrm>
-              <a:off x="23149198" y="8221210"/>
+              <a:off x="23176873" y="8203038"/>
               <a:ext cx="6858000" cy="3107944"/>
             </p:xfrm>
             <a:graphic>
@@ -7310,13 +7306,13 @@
               <p:nvPr>
                 <p:extLst>
                   <p:ext uri="{D42A27DB-BD31-4B8C-83A1-F6EECF244321}">
-                    <p14:modId xmlns:p14="http://schemas.microsoft.com/office/powerpoint/2010/main" val="60645567"/>
+                    <p14:modId xmlns:p14="http://schemas.microsoft.com/office/powerpoint/2010/main" val="3655561168"/>
                   </p:ext>
                 </p:extLst>
               </p:nvPr>
             </p:nvGraphicFramePr>
             <p:xfrm>
-              <a:off x="23149198" y="8221210"/>
+              <a:off x="23176873" y="8203038"/>
               <a:ext cx="6858000" cy="3107944"/>
             </p:xfrm>
             <a:graphic>
@@ -7431,7 +7427,7 @@
                         <a:blipFill>
                           <a:blip r:embed="rId7"/>
                           <a:stretch>
-                            <a:fillRect t="-186047" r="-624000" b="-325581"/>
+                            <a:fillRect t="-186047" r="-625333" b="-325581"/>
                           </a:stretch>
                         </a:blipFill>
                       </a:tcPr>
@@ -7499,7 +7495,7 @@
                         <a:blipFill>
                           <a:blip r:embed="rId7"/>
                           <a:stretch>
-                            <a:fillRect t="-292857" r="-624000" b="-233333"/>
+                            <a:fillRect t="-292857" r="-625333" b="-233333"/>
                           </a:stretch>
                         </a:blipFill>
                       </a:tcPr>
@@ -7567,7 +7563,7 @@
                         <a:blipFill>
                           <a:blip r:embed="rId7"/>
                           <a:stretch>
-                            <a:fillRect t="-383721" r="-624000" b="-127907"/>
+                            <a:fillRect t="-383721" r="-625333" b="-127907"/>
                           </a:stretch>
                         </a:blipFill>
                       </a:tcPr>
@@ -7635,7 +7631,7 @@
                         <a:blipFill>
                           <a:blip r:embed="rId7"/>
                           <a:stretch>
-                            <a:fillRect t="-483721" r="-624000" b="-27907"/>
+                            <a:fillRect t="-483721" r="-625333" b="-27907"/>
                           </a:stretch>
                         </a:blipFill>
                       </a:tcPr>
@@ -7713,13 +7709,13 @@
               <p:nvPr>
                 <p:extLst>
                   <p:ext uri="{D42A27DB-BD31-4B8C-83A1-F6EECF244321}">
-                    <p14:modId xmlns:p14="http://schemas.microsoft.com/office/powerpoint/2010/main" val="3853628893"/>
+                    <p14:modId xmlns:p14="http://schemas.microsoft.com/office/powerpoint/2010/main" val="1197732028"/>
                   </p:ext>
                 </p:extLst>
               </p:nvPr>
             </p:nvGraphicFramePr>
             <p:xfrm>
-              <a:off x="23149198" y="17663559"/>
+              <a:off x="23149199" y="17629613"/>
               <a:ext cx="6858000" cy="3107944"/>
             </p:xfrm>
             <a:graphic>
@@ -8338,13 +8334,13 @@
               <p:nvPr>
                 <p:extLst>
                   <p:ext uri="{D42A27DB-BD31-4B8C-83A1-F6EECF244321}">
-                    <p14:modId xmlns:p14="http://schemas.microsoft.com/office/powerpoint/2010/main" val="3853628893"/>
+                    <p14:modId xmlns:p14="http://schemas.microsoft.com/office/powerpoint/2010/main" val="1197732028"/>
                   </p:ext>
                 </p:extLst>
               </p:nvPr>
             </p:nvGraphicFramePr>
             <p:xfrm>
-              <a:off x="23149198" y="17663559"/>
+              <a:off x="23149199" y="17629613"/>
               <a:ext cx="6858000" cy="3107944"/>
             </p:xfrm>
             <a:graphic>
@@ -8527,7 +8523,7 @@
                         <a:blipFill>
                           <a:blip r:embed="rId8"/>
                           <a:stretch>
-                            <a:fillRect t="-292857" r="-554217" b="-233333"/>
+                            <a:fillRect t="-286047" r="-554217" b="-225581"/>
                           </a:stretch>
                         </a:blipFill>
                       </a:tcPr>
@@ -8595,7 +8591,7 @@
                         <a:blipFill>
                           <a:blip r:embed="rId8"/>
                           <a:stretch>
-                            <a:fillRect t="-383721" r="-554217" b="-127907"/>
+                            <a:fillRect t="-395238" r="-554217" b="-130952"/>
                           </a:stretch>
                         </a:blipFill>
                       </a:tcPr>
@@ -9151,8 +9147,8 @@
         </p:nvSpPr>
         <p:spPr>
           <a:xfrm>
-            <a:off x="22929888" y="7393289"/>
-            <a:ext cx="10386337" cy="984845"/>
+            <a:off x="23149199" y="7417204"/>
+            <a:ext cx="6858000" cy="984845"/>
           </a:xfrm>
           <a:prstGeom prst="rect">
             <a:avLst/>
@@ -9218,8 +9214,8 @@
         </p:nvSpPr>
         <p:spPr>
           <a:xfrm>
-            <a:off x="22929888" y="16746100"/>
-            <a:ext cx="10386337" cy="984845"/>
+            <a:off x="23149199" y="16744961"/>
+            <a:ext cx="6858000" cy="984845"/>
           </a:xfrm>
           <a:prstGeom prst="rect">
             <a:avLst/>
@@ -9798,16 +9794,15 @@
           </p:cNvPicPr>
           <p:nvPr/>
         </p:nvPicPr>
-        <p:blipFill>
+        <p:blipFill rotWithShape="1">
           <a:blip r:embed="rId12"/>
-          <a:stretch>
-            <a:fillRect/>
-          </a:stretch>
+          <a:srcRect b="23065"/>
+          <a:stretch/>
         </p:blipFill>
         <p:spPr>
           <a:xfrm>
-            <a:off x="31155031" y="15574179"/>
-            <a:ext cx="10550769" cy="5486400"/>
+            <a:off x="31155031" y="15022227"/>
+            <a:ext cx="10550769" cy="5970294"/>
           </a:xfrm>
           <a:prstGeom prst="rect">
             <a:avLst/>
@@ -9828,24 +9823,23 @@
           </p:cNvPicPr>
           <p:nvPr/>
         </p:nvPicPr>
-        <p:blipFill>
+        <p:blipFill rotWithShape="1">
           <a:blip r:embed="rId13"/>
-          <a:stretch>
-            <a:fillRect/>
-          </a:stretch>
+          <a:srcRect b="23071"/>
+          <a:stretch/>
         </p:blipFill>
         <p:spPr>
           <a:xfrm>
             <a:off x="31155031" y="7670186"/>
-            <a:ext cx="10550769" cy="5486400"/>
+            <a:ext cx="10550769" cy="5418341"/>
           </a:xfrm>
           <a:prstGeom prst="rect">
             <a:avLst/>
           </a:prstGeom>
         </p:spPr>
       </p:pic>
-      <mc:AlternateContent xmlns:mc="http://schemas.openxmlformats.org/markup-compatibility/2006">
-        <mc:Choice xmlns:a14="http://schemas.microsoft.com/office/drawing/2010/main" Requires="a14">
+      <mc:AlternateContent xmlns:mc="http://schemas.openxmlformats.org/markup-compatibility/2006" xmlns:a14="http://schemas.microsoft.com/office/drawing/2010/main">
+        <mc:Choice Requires="a14">
           <p:sp>
             <p:nvSpPr>
               <p:cNvPr id="40" name="Google Shape;67;p13">
@@ -10708,7 +10702,7 @@
             </p:txBody>
           </p:sp>
         </mc:Choice>
-        <mc:Fallback>
+        <mc:Fallback xmlns="">
           <p:sp>
             <p:nvSpPr>
               <p:cNvPr id="40" name="Google Shape;67;p13">
@@ -11308,6 +11302,9 @@
                         <m:chr m:val="̂"/>
                         <m:ctrlPr>
                           <a:rPr lang="en-US" sz="2800" i="1" smtClean="0">
+                            <a:solidFill>
+                              <a:srgbClr val="522E5E"/>
+                            </a:solidFill>
                             <a:latin typeface="Cambria Math" panose="02040503050406030204" pitchFamily="18" charset="0"/>
                             <a:ea typeface="Roboto" panose="02000000000000000000" pitchFamily="2" charset="0"/>
                             <a:cs typeface="Roboto" panose="02000000000000000000" pitchFamily="2" charset="0"/>
@@ -11319,6 +11316,9 @@
                           <m:sSubPr>
                             <m:ctrlPr>
                               <a:rPr lang="en-US" sz="2800" i="1" smtClean="0">
+                                <a:solidFill>
+                                  <a:srgbClr val="522E5E"/>
+                                </a:solidFill>
                                 <a:latin typeface="Cambria Math" panose="02040503050406030204" pitchFamily="18" charset="0"/>
                                 <a:ea typeface="Roboto" panose="02000000000000000000" pitchFamily="2" charset="0"/>
                                 <a:cs typeface="Roboto" panose="02000000000000000000" pitchFamily="2" charset="0"/>
@@ -11328,6 +11328,9 @@
                           <m:e>
                             <m:r>
                               <a:rPr lang="en-US" sz="2800" i="1" smtClean="0">
+                                <a:solidFill>
+                                  <a:srgbClr val="522E5E"/>
+                                </a:solidFill>
                                 <a:latin typeface="Cambria Math" panose="02040503050406030204" pitchFamily="18" charset="0"/>
                                 <a:ea typeface="Cambria Math" panose="02040503050406030204" pitchFamily="18" charset="0"/>
                                 <a:cs typeface="Roboto" panose="02000000000000000000" pitchFamily="2" charset="0"/>
@@ -11338,6 +11341,9 @@
                           <m:sub>
                             <m:r>
                               <a:rPr lang="en-US" sz="2800" b="0" i="1" smtClean="0">
+                                <a:solidFill>
+                                  <a:srgbClr val="522E5E"/>
+                                </a:solidFill>
                                 <a:latin typeface="Cambria Math" panose="02040503050406030204" pitchFamily="18" charset="0"/>
                                 <a:ea typeface="Cambria Math" panose="02040503050406030204" pitchFamily="18" charset="0"/>
                                 <a:cs typeface="Roboto" panose="02000000000000000000" pitchFamily="2" charset="0"/>
@@ -11414,6 +11420,9 @@
                         <m:chr m:val="̂"/>
                         <m:ctrlPr>
                           <a:rPr lang="en-US" sz="2800" i="1" smtClean="0">
+                            <a:solidFill>
+                              <a:srgbClr val="DD304A"/>
+                            </a:solidFill>
                             <a:latin typeface="Cambria Math" panose="02040503050406030204" pitchFamily="18" charset="0"/>
                             <a:ea typeface="Roboto" panose="02000000000000000000" pitchFamily="2" charset="0"/>
                             <a:cs typeface="Roboto" panose="02000000000000000000" pitchFamily="2" charset="0"/>
@@ -11425,6 +11434,9 @@
                           <m:sSubPr>
                             <m:ctrlPr>
                               <a:rPr lang="en-US" sz="2800" i="1" smtClean="0">
+                                <a:solidFill>
+                                  <a:srgbClr val="DD304A"/>
+                                </a:solidFill>
                                 <a:latin typeface="Cambria Math" panose="02040503050406030204" pitchFamily="18" charset="0"/>
                                 <a:ea typeface="Roboto" panose="02000000000000000000" pitchFamily="2" charset="0"/>
                                 <a:cs typeface="Roboto" panose="02000000000000000000" pitchFamily="2" charset="0"/>
@@ -11434,6 +11446,9 @@
                           <m:e>
                             <m:r>
                               <a:rPr lang="en-US" sz="2800" i="1" smtClean="0">
+                                <a:solidFill>
+                                  <a:srgbClr val="DD304A"/>
+                                </a:solidFill>
                                 <a:latin typeface="Cambria Math" panose="02040503050406030204" pitchFamily="18" charset="0"/>
                                 <a:ea typeface="Cambria Math" panose="02040503050406030204" pitchFamily="18" charset="0"/>
                                 <a:cs typeface="Roboto" panose="02000000000000000000" pitchFamily="2" charset="0"/>
@@ -11444,6 +11459,9 @@
                           <m:sub>
                             <m:r>
                               <a:rPr lang="en-US" sz="2800" b="0" i="1" smtClean="0">
+                                <a:solidFill>
+                                  <a:srgbClr val="DD304A"/>
+                                </a:solidFill>
                                 <a:latin typeface="Cambria Math" panose="02040503050406030204" pitchFamily="18" charset="0"/>
                                 <a:ea typeface="Cambria Math" panose="02040503050406030204" pitchFamily="18" charset="0"/>
                                 <a:cs typeface="Roboto" panose="02000000000000000000" pitchFamily="2" charset="0"/>
@@ -11454,6 +11472,9 @@
                         </m:sSub>
                         <m:r>
                           <a:rPr lang="en-US" sz="2800" b="0" i="1" smtClean="0">
+                            <a:solidFill>
+                              <a:srgbClr val="DD304A"/>
+                            </a:solidFill>
                             <a:latin typeface="Cambria Math" panose="02040503050406030204" pitchFamily="18" charset="0"/>
                             <a:ea typeface="Cambria Math" panose="02040503050406030204" pitchFamily="18" charset="0"/>
                             <a:cs typeface="Roboto" panose="02000000000000000000" pitchFamily="2" charset="0"/>

</xml_diff>

<commit_message>
remove legend, save as PDF
DONE :)
</commit_message>
<xml_diff>
--- a/Final Poster Draft.pptx
+++ b/Final Poster Draft.pptx
@@ -6664,8 +6664,8 @@
           </a:p>
         </p:txBody>
       </p:sp>
-      <mc:AlternateContent xmlns:mc="http://schemas.openxmlformats.org/markup-compatibility/2006">
-        <mc:Choice xmlns:a14="http://schemas.microsoft.com/office/drawing/2010/main" Requires="a14">
+      <mc:AlternateContent xmlns:mc="http://schemas.openxmlformats.org/markup-compatibility/2006" xmlns:a14="http://schemas.microsoft.com/office/drawing/2010/main">
+        <mc:Choice Requires="a14">
           <p:graphicFrame>
             <p:nvGraphicFramePr>
               <p:cNvPr id="9" name="Table 8">
@@ -7290,7 +7290,7 @@
             </a:graphic>
           </p:graphicFrame>
         </mc:Choice>
-        <mc:Fallback>
+        <mc:Fallback xmlns="">
           <p:graphicFrame>
             <p:nvGraphicFramePr>
               <p:cNvPr id="9" name="Table 8">
@@ -7692,8 +7692,8 @@
           </p:graphicFrame>
         </mc:Fallback>
       </mc:AlternateContent>
-      <mc:AlternateContent xmlns:mc="http://schemas.openxmlformats.org/markup-compatibility/2006">
-        <mc:Choice xmlns:a14="http://schemas.microsoft.com/office/drawing/2010/main" Requires="a14">
+      <mc:AlternateContent xmlns:mc="http://schemas.openxmlformats.org/markup-compatibility/2006" xmlns:a14="http://schemas.microsoft.com/office/drawing/2010/main">
+        <mc:Choice Requires="a14">
           <p:graphicFrame>
             <p:nvGraphicFramePr>
               <p:cNvPr id="11" name="Table 10">
@@ -8318,7 +8318,7 @@
             </a:graphic>
           </p:graphicFrame>
         </mc:Choice>
-        <mc:Fallback>
+        <mc:Fallback xmlns="">
           <p:graphicFrame>
             <p:nvGraphicFramePr>
               <p:cNvPr id="11" name="Table 10">
@@ -9774,64 +9774,6 @@
           <a:xfrm>
             <a:off x="12056941" y="14163324"/>
             <a:ext cx="10550769" cy="5486400"/>
-          </a:xfrm>
-          <a:prstGeom prst="rect">
-            <a:avLst/>
-          </a:prstGeom>
-        </p:spPr>
-      </p:pic>
-      <p:pic>
-        <p:nvPicPr>
-          <p:cNvPr id="33" name="Picture 32" descr="A screen shot of a graph&#10;&#10;Description automatically generated">
-            <a:extLst>
-              <a:ext uri="{FF2B5EF4-FFF2-40B4-BE49-F238E27FC236}">
-                <a16:creationId xmlns:a16="http://schemas.microsoft.com/office/drawing/2014/main" id="{54B1EF89-E09B-A71B-69DF-2FAC279762A4}"/>
-              </a:ext>
-            </a:extLst>
-          </p:cNvPr>
-          <p:cNvPicPr>
-            <a:picLocks noChangeAspect="1"/>
-          </p:cNvPicPr>
-          <p:nvPr/>
-        </p:nvPicPr>
-        <p:blipFill rotWithShape="1">
-          <a:blip r:embed="rId12"/>
-          <a:srcRect b="23065"/>
-          <a:stretch/>
-        </p:blipFill>
-        <p:spPr>
-          <a:xfrm>
-            <a:off x="31155031" y="15022227"/>
-            <a:ext cx="10550769" cy="5970294"/>
-          </a:xfrm>
-          <a:prstGeom prst="rect">
-            <a:avLst/>
-          </a:prstGeom>
-        </p:spPr>
-      </p:pic>
-      <p:pic>
-        <p:nvPicPr>
-          <p:cNvPr id="38" name="Picture 37" descr="A graph of a child rating trends&#10;&#10;Description automatically generated">
-            <a:extLst>
-              <a:ext uri="{FF2B5EF4-FFF2-40B4-BE49-F238E27FC236}">
-                <a16:creationId xmlns:a16="http://schemas.microsoft.com/office/drawing/2014/main" id="{835F9DEF-1D61-8F34-5D17-2D549F6E80BA}"/>
-              </a:ext>
-            </a:extLst>
-          </p:cNvPr>
-          <p:cNvPicPr>
-            <a:picLocks noChangeAspect="1"/>
-          </p:cNvPicPr>
-          <p:nvPr/>
-        </p:nvPicPr>
-        <p:blipFill rotWithShape="1">
-          <a:blip r:embed="rId13"/>
-          <a:srcRect b="23071"/>
-          <a:stretch/>
-        </p:blipFill>
-        <p:spPr>
-          <a:xfrm>
-            <a:off x="31155031" y="7670186"/>
-            <a:ext cx="10550769" cy="5418341"/>
           </a:xfrm>
           <a:prstGeom prst="rect">
             <a:avLst/>
@@ -11176,8 +11118,8 @@
           </a:p>
         </p:txBody>
       </p:sp>
-      <mc:AlternateContent xmlns:mc="http://schemas.openxmlformats.org/markup-compatibility/2006">
-        <mc:Choice xmlns:a14="http://schemas.microsoft.com/office/drawing/2010/main" Requires="a14">
+      <mc:AlternateContent xmlns:mc="http://schemas.openxmlformats.org/markup-compatibility/2006" xmlns:a14="http://schemas.microsoft.com/office/drawing/2010/main">
+        <mc:Choice Requires="a14">
           <p:sp>
             <p:nvSpPr>
               <p:cNvPr id="48" name="Google Shape;155;p14">
@@ -11521,7 +11463,7 @@
             </p:txBody>
           </p:sp>
         </mc:Choice>
-        <mc:Fallback>
+        <mc:Fallback xmlns="">
           <p:sp>
             <p:nvSpPr>
               <p:cNvPr id="48" name="Google Shape;155;p14">
@@ -11710,6 +11652,66 @@
           </a:p>
         </p:txBody>
       </p:sp>
+      <p:pic>
+        <p:nvPicPr>
+          <p:cNvPr id="10" name="Picture 9" descr="A graph of different colored dots&#10;&#10;Description automatically generated">
+            <a:extLst>
+              <a:ext uri="{FF2B5EF4-FFF2-40B4-BE49-F238E27FC236}">
+                <a16:creationId xmlns:a16="http://schemas.microsoft.com/office/drawing/2014/main" id="{1E771C6A-767D-52FE-1355-19EEDF802C4F}"/>
+              </a:ext>
+            </a:extLst>
+          </p:cNvPr>
+          <p:cNvPicPr>
+            <a:picLocks noChangeAspect="1"/>
+          </p:cNvPicPr>
+          <p:nvPr/>
+        </p:nvPicPr>
+        <p:blipFill>
+          <a:blip r:embed="rId17"/>
+          <a:stretch>
+            <a:fillRect/>
+          </a:stretch>
+        </p:blipFill>
+        <p:spPr>
+          <a:xfrm>
+            <a:off x="31103183" y="7515729"/>
+            <a:ext cx="10550769" cy="5486400"/>
+          </a:xfrm>
+          <a:prstGeom prst="rect">
+            <a:avLst/>
+          </a:prstGeom>
+        </p:spPr>
+      </p:pic>
+      <p:pic>
+        <p:nvPicPr>
+          <p:cNvPr id="17" name="Picture 16" descr="A screen shot of a graph&#10;&#10;Description automatically generated">
+            <a:extLst>
+              <a:ext uri="{FF2B5EF4-FFF2-40B4-BE49-F238E27FC236}">
+                <a16:creationId xmlns:a16="http://schemas.microsoft.com/office/drawing/2014/main" id="{1EAB0808-A5EB-002F-4B1B-DEF4B84BAEAA}"/>
+              </a:ext>
+            </a:extLst>
+          </p:cNvPr>
+          <p:cNvPicPr>
+            <a:picLocks noChangeAspect="1"/>
+          </p:cNvPicPr>
+          <p:nvPr/>
+        </p:nvPicPr>
+        <p:blipFill>
+          <a:blip r:embed="rId18"/>
+          <a:stretch>
+            <a:fillRect/>
+          </a:stretch>
+        </p:blipFill>
+        <p:spPr>
+          <a:xfrm>
+            <a:off x="31103183" y="15186471"/>
+            <a:ext cx="10550769" cy="5486400"/>
+          </a:xfrm>
+          <a:prstGeom prst="rect">
+            <a:avLst/>
+          </a:prstGeom>
+        </p:spPr>
+      </p:pic>
     </p:spTree>
   </p:cSld>
   <p:clrMapOvr>

</xml_diff>